<commit_message>
update pertemuan ke 5
</commit_message>
<xml_diff>
--- a/Pertemuan4/Topik IV dan V - Percabangan Bertingkat.pptx
+++ b/Pertemuan4/Topik IV dan V - Percabangan Bertingkat.pptx
@@ -227,7 +227,7 @@
           <a:p>
             <a:fld id="{3F6F375D-CB1E-4E46-924A-EDD52BCE34C2}" type="datetimeFigureOut">
               <a:rPr lang="en-US" smtClean="0"/>
-              <a:t>9/20/2022</a:t>
+              <a:t>9/24/2022</a:t>
             </a:fld>
             <a:endParaRPr lang="en-US"/>
           </a:p>
@@ -393,7 +393,7 @@
             <a:fld id="{7805F6AA-2570-4607-9BD4-7E9FAB49A4D6}" type="datetimeFigureOut">
               <a:rPr lang="en-US" smtClean="0"/>
               <a:pPr/>
-              <a:t>9/20/2022</a:t>
+              <a:t>9/24/2022</a:t>
             </a:fld>
             <a:endParaRPr lang="en-US"/>
           </a:p>
@@ -1057,7 +1057,7 @@
           <a:p>
             <a:fld id="{0B2A2A5F-C929-4406-A67E-4E586008196E}" type="datetime1">
               <a:rPr lang="en-US" smtClean="0"/>
-              <a:t>9/20/2022</a:t>
+              <a:t>9/24/2022</a:t>
             </a:fld>
             <a:endParaRPr lang="en-US" dirty="0"/>
           </a:p>
@@ -1265,7 +1265,7 @@
           <a:p>
             <a:fld id="{37237D3B-DDC1-4CEA-8563-D1DC7948418D}" type="datetime1">
               <a:rPr lang="en-US" smtClean="0"/>
-              <a:t>9/20/2022</a:t>
+              <a:t>9/24/2022</a:t>
             </a:fld>
             <a:endParaRPr lang="en-US" dirty="0"/>
           </a:p>
@@ -1521,7 +1521,7 @@
           <a:p>
             <a:fld id="{D0882124-A542-4E7F-AA0B-039D3B210973}" type="datetime1">
               <a:rPr lang="en-US" smtClean="0"/>
-              <a:t>9/20/2022</a:t>
+              <a:t>9/24/2022</a:t>
             </a:fld>
             <a:endParaRPr lang="en-US" dirty="0"/>
           </a:p>
@@ -1695,7 +1695,7 @@
           <a:p>
             <a:fld id="{C8EB929C-F006-4FEE-BE42-215AC7BDCBDB}" type="datetime1">
               <a:rPr lang="en-US" smtClean="0"/>
-              <a:t>9/20/2022</a:t>
+              <a:t>9/24/2022</a:t>
             </a:fld>
             <a:endParaRPr lang="en-US" dirty="0"/>
           </a:p>
@@ -2038,7 +2038,7 @@
           <a:p>
             <a:fld id="{B45292AB-BEC6-4C30-A179-A275E1B14EB6}" type="datetime1">
               <a:rPr lang="en-US" smtClean="0"/>
-              <a:t>9/20/2022</a:t>
+              <a:t>9/24/2022</a:t>
             </a:fld>
             <a:endParaRPr lang="en-US" dirty="0"/>
           </a:p>
@@ -2313,7 +2313,7 @@
           <a:p>
             <a:fld id="{926F3EB4-F962-4424-8809-943E76CDBABE}" type="datetime1">
               <a:rPr lang="en-US" smtClean="0"/>
-              <a:t>9/20/2022</a:t>
+              <a:t>9/24/2022</a:t>
             </a:fld>
             <a:endParaRPr lang="en-US" dirty="0"/>
           </a:p>
@@ -2692,7 +2692,7 @@
           <a:p>
             <a:fld id="{39DED185-65A5-4CF8-990B-637C010CB41F}" type="datetime1">
               <a:rPr lang="en-US" smtClean="0"/>
-              <a:t>9/20/2022</a:t>
+              <a:t>9/24/2022</a:t>
             </a:fld>
             <a:endParaRPr lang="en-US" dirty="0"/>
           </a:p>
@@ -2810,7 +2810,7 @@
           <a:p>
             <a:fld id="{F117B84E-DCC7-4BF6-ABCE-0FBDD174BA58}" type="datetime1">
               <a:rPr lang="en-US" smtClean="0"/>
-              <a:t>9/20/2022</a:t>
+              <a:t>9/24/2022</a:t>
             </a:fld>
             <a:endParaRPr lang="en-US" dirty="0"/>
           </a:p>
@@ -2981,7 +2981,7 @@
           <a:p>
             <a:fld id="{95A65F09-1DBC-432E-B4AE-132ACC918422}" type="datetime1">
               <a:rPr lang="en-US" smtClean="0"/>
-              <a:t>9/20/2022</a:t>
+              <a:t>9/24/2022</a:t>
             </a:fld>
             <a:endParaRPr lang="en-US" dirty="0"/>
           </a:p>
@@ -3335,7 +3335,7 @@
           <a:p>
             <a:fld id="{B29E3C90-D788-4B64-B148-8CCEA7DEAA3F}" type="datetime1">
               <a:rPr lang="en-US" smtClean="0"/>
-              <a:t>9/20/2022</a:t>
+              <a:t>9/24/2022</a:t>
             </a:fld>
             <a:endParaRPr lang="en-US" dirty="0"/>
           </a:p>
@@ -3717,7 +3717,7 @@
           <a:p>
             <a:fld id="{6BD9E166-A443-4A5E-90C8-243D469D3CEF}" type="datetime1">
               <a:rPr lang="en-US" smtClean="0"/>
-              <a:t>9/20/2022</a:t>
+              <a:t>9/24/2022</a:t>
             </a:fld>
             <a:endParaRPr lang="en-US" dirty="0"/>
           </a:p>
@@ -4004,7 +4004,7 @@
           <a:p>
             <a:fld id="{E1226E90-A1FB-4CDC-9262-FACA96BE05BC}" type="datetime1">
               <a:rPr lang="en-US" smtClean="0"/>
-              <a:t>9/20/2022</a:t>
+              <a:t>9/24/2022</a:t>
             </a:fld>
             <a:endParaRPr lang="en-US" dirty="0"/>
           </a:p>
@@ -4739,7 +4739,7 @@
           <a:p>
             <a:fld id="{F484424F-3C09-47BA-9996-BC22384F7B0C}" type="datetime1">
               <a:rPr lang="en-US" sz="1400" smtClean="0"/>
-              <a:t>9/20/2022</a:t>
+              <a:t>9/24/2022</a:t>
             </a:fld>
             <a:endParaRPr lang="en-US" sz="1400" dirty="0"/>
           </a:p>
@@ -8126,7 +8126,7 @@
           <a:p>
             <a:fld id="{C8EB929C-F006-4FEE-BE42-215AC7BDCBDB}" type="datetime1">
               <a:rPr lang="en-US" smtClean="0"/>
-              <a:t>9/20/2022</a:t>
+              <a:t>9/24/2022</a:t>
             </a:fld>
             <a:endParaRPr lang="en-US" dirty="0"/>
           </a:p>
@@ -8669,7 +8669,7 @@
           <a:p>
             <a:fld id="{C8EB929C-F006-4FEE-BE42-215AC7BDCBDB}" type="datetime1">
               <a:rPr lang="en-US" smtClean="0"/>
-              <a:t>9/20/2022</a:t>
+              <a:t>9/24/2022</a:t>
             </a:fld>
             <a:endParaRPr lang="en-US" dirty="0"/>
           </a:p>
@@ -10748,7 +10748,7 @@
           <a:p>
             <a:fld id="{C8EB929C-F006-4FEE-BE42-215AC7BDCBDB}" type="datetime1">
               <a:rPr lang="en-US" smtClean="0"/>
-              <a:t>9/20/2022</a:t>
+              <a:t>9/24/2022</a:t>
             </a:fld>
             <a:endParaRPr lang="en-US" dirty="0"/>
           </a:p>
@@ -10934,7 +10934,7 @@
           <a:p>
             <a:fld id="{F6255F13-034C-4669-AAFC-F1668836CBB3}" type="datetime1">
               <a:rPr lang="en-US" smtClean="0"/>
-              <a:t>9/20/2022</a:t>
+              <a:t>9/24/2022</a:t>
             </a:fld>
             <a:endParaRPr lang="en-US" dirty="0"/>
           </a:p>
@@ -13853,7 +13853,7 @@
         <p:spPr>
           <a:xfrm>
             <a:off x="1899139" y="1922584"/>
-            <a:ext cx="8235304" cy="2677656"/>
+            <a:ext cx="8235304" cy="3539430"/>
           </a:xfrm>
           <a:prstGeom prst="rect">
             <a:avLst/>
@@ -14055,6 +14055,121 @@
           </a:p>
           <a:p>
             <a:pPr algn="just"/>
+            <a:r>
+              <a:rPr lang="en-US" sz="2800" dirty="0"/>
+              <a:t>Jika </a:t>
+            </a:r>
+            <a:r>
+              <a:rPr lang="en-US" sz="2800" dirty="0" err="1"/>
+              <a:t>lebih</a:t>
+            </a:r>
+            <a:r>
+              <a:rPr lang="en-US" sz="2800" dirty="0"/>
+              <a:t> </a:t>
+            </a:r>
+            <a:r>
+              <a:rPr lang="en-US" sz="2800" dirty="0" err="1"/>
+              <a:t>dari</a:t>
+            </a:r>
+            <a:r>
+              <a:rPr lang="en-US" sz="2800" dirty="0"/>
+              <a:t> 500.000 </a:t>
+            </a:r>
+            <a:r>
+              <a:rPr lang="en-US" sz="2800" dirty="0" err="1"/>
+              <a:t>maka</a:t>
+            </a:r>
+            <a:r>
+              <a:rPr lang="en-US" sz="2800" dirty="0"/>
+              <a:t> </a:t>
+            </a:r>
+            <a:r>
+              <a:rPr lang="en-US" sz="2800" dirty="0" err="1"/>
+              <a:t>diskon</a:t>
+            </a:r>
+            <a:r>
+              <a:rPr lang="en-US" sz="2800" dirty="0"/>
+              <a:t> 50%.</a:t>
+            </a:r>
+          </a:p>
+          <a:p>
+            <a:pPr algn="just"/>
+            <a:r>
+              <a:rPr lang="en-US" sz="2800" dirty="0"/>
+              <a:t>Jika </a:t>
+            </a:r>
+            <a:r>
+              <a:rPr lang="en-US" sz="2800" dirty="0" err="1"/>
+              <a:t>lebih</a:t>
+            </a:r>
+            <a:r>
+              <a:rPr lang="en-US" sz="2800" dirty="0"/>
+              <a:t> </a:t>
+            </a:r>
+            <a:r>
+              <a:rPr lang="en-US" sz="2800" dirty="0" err="1"/>
+              <a:t>dari</a:t>
+            </a:r>
+            <a:r>
+              <a:rPr lang="en-US" sz="2800" dirty="0"/>
+              <a:t> 800.000 dan </a:t>
+            </a:r>
+            <a:r>
+              <a:rPr lang="en-US" sz="2800" dirty="0" err="1"/>
+              <a:t>jumlah</a:t>
+            </a:r>
+            <a:r>
+              <a:rPr lang="en-US" sz="2800" dirty="0"/>
+              <a:t> </a:t>
+            </a:r>
+            <a:r>
+              <a:rPr lang="en-US" sz="2800" dirty="0" err="1"/>
+              <a:t>barang</a:t>
+            </a:r>
+            <a:r>
+              <a:rPr lang="en-US" sz="2800" dirty="0"/>
+              <a:t> </a:t>
+            </a:r>
+            <a:r>
+              <a:rPr lang="en-US" sz="2800" dirty="0" err="1"/>
+              <a:t>lebih</a:t>
+            </a:r>
+            <a:r>
+              <a:rPr lang="en-US" sz="2800" dirty="0"/>
+              <a:t> </a:t>
+            </a:r>
+            <a:r>
+              <a:rPr lang="en-US" sz="2800" dirty="0" err="1"/>
+              <a:t>dari</a:t>
+            </a:r>
+            <a:r>
+              <a:rPr lang="en-US" sz="2800"/>
+              <a:t> 2 </a:t>
+            </a:r>
+            <a:r>
+              <a:rPr lang="en-US" sz="2800" dirty="0" err="1"/>
+              <a:t>maka</a:t>
+            </a:r>
+            <a:r>
+              <a:rPr lang="en-US" sz="2800" dirty="0"/>
+              <a:t> di </a:t>
+            </a:r>
+            <a:r>
+              <a:rPr lang="en-US" sz="2800" dirty="0" err="1"/>
+              <a:t>berikan</a:t>
+            </a:r>
+            <a:r>
+              <a:rPr lang="en-US" sz="2800" dirty="0"/>
+              <a:t> </a:t>
+            </a:r>
+            <a:r>
+              <a:rPr lang="en-US" sz="2800" dirty="0" err="1"/>
+              <a:t>diskon</a:t>
+            </a:r>
+            <a:r>
+              <a:rPr lang="en-US" sz="2800" dirty="0"/>
+              <a:t> 75%.</a:t>
+            </a:r>
             <a:endParaRPr lang="id-ID" sz="2800" dirty="0"/>
           </a:p>
         </p:txBody>

</xml_diff>